<commit_message>
Add mobile handson 2nd
</commit_message>
<xml_diff>
--- a/20201213/intro.pptx
+++ b/20201213/intro.pptx
@@ -771,13 +771,13 @@
   <p:clrMapOvr>
     <a:masterClrMapping/>
   </p:clrMapOvr>
-  <mc:AlternateContent xmlns:mc="http://schemas.openxmlformats.org/markup-compatibility/2006">
-    <mc:Choice xmlns:p14="http://schemas.microsoft.com/office/powerpoint/2010/main" Requires="p14">
+  <mc:AlternateContent xmlns:mc="http://schemas.openxmlformats.org/markup-compatibility/2006" xmlns:p14="http://schemas.microsoft.com/office/powerpoint/2010/main">
+    <mc:Choice Requires="p14">
       <p:transition spd="med" p14:dur="700" advClick="0" advTm="12000">
         <p:fade/>
       </p:transition>
     </mc:Choice>
-    <mc:Fallback>
+    <mc:Fallback xmlns="">
       <p:transition spd="med" advClick="0" advTm="12000">
         <p:fade/>
       </p:transition>
@@ -985,13 +985,13 @@
   <p:clrMapOvr>
     <a:masterClrMapping/>
   </p:clrMapOvr>
-  <mc:AlternateContent xmlns:mc="http://schemas.openxmlformats.org/markup-compatibility/2006">
-    <mc:Choice xmlns:p14="http://schemas.microsoft.com/office/powerpoint/2010/main" Requires="p14">
+  <mc:AlternateContent xmlns:mc="http://schemas.openxmlformats.org/markup-compatibility/2006" xmlns:p14="http://schemas.microsoft.com/office/powerpoint/2010/main">
+    <mc:Choice Requires="p14">
       <p:transition spd="med" p14:dur="700" advClick="0" advTm="12000">
         <p:fade/>
       </p:transition>
     </mc:Choice>
-    <mc:Fallback>
+    <mc:Fallback xmlns="">
       <p:transition spd="med" advClick="0" advTm="12000">
         <p:fade/>
       </p:transition>
@@ -1209,13 +1209,13 @@
   <p:clrMapOvr>
     <a:masterClrMapping/>
   </p:clrMapOvr>
-  <mc:AlternateContent xmlns:mc="http://schemas.openxmlformats.org/markup-compatibility/2006">
-    <mc:Choice xmlns:p14="http://schemas.microsoft.com/office/powerpoint/2010/main" Requires="p14">
+  <mc:AlternateContent xmlns:mc="http://schemas.openxmlformats.org/markup-compatibility/2006" xmlns:p14="http://schemas.microsoft.com/office/powerpoint/2010/main">
+    <mc:Choice Requires="p14">
       <p:transition spd="med" p14:dur="700" advClick="0" advTm="12000">
         <p:fade/>
       </p:transition>
     </mc:Choice>
-    <mc:Fallback>
+    <mc:Fallback xmlns="">
       <p:transition spd="med" advClick="0" advTm="12000">
         <p:fade/>
       </p:transition>
@@ -1423,13 +1423,13 @@
   <p:clrMapOvr>
     <a:masterClrMapping/>
   </p:clrMapOvr>
-  <mc:AlternateContent xmlns:mc="http://schemas.openxmlformats.org/markup-compatibility/2006">
-    <mc:Choice xmlns:p14="http://schemas.microsoft.com/office/powerpoint/2010/main" Requires="p14">
+  <mc:AlternateContent xmlns:mc="http://schemas.openxmlformats.org/markup-compatibility/2006" xmlns:p14="http://schemas.microsoft.com/office/powerpoint/2010/main">
+    <mc:Choice Requires="p14">
       <p:transition spd="med" p14:dur="700" advClick="0" advTm="12000">
         <p:fade/>
       </p:transition>
     </mc:Choice>
-    <mc:Fallback>
+    <mc:Fallback xmlns="">
       <p:transition spd="med" advClick="0" advTm="12000">
         <p:fade/>
       </p:transition>
@@ -1681,13 +1681,13 @@
   <p:clrMapOvr>
     <a:masterClrMapping/>
   </p:clrMapOvr>
-  <mc:AlternateContent xmlns:mc="http://schemas.openxmlformats.org/markup-compatibility/2006">
-    <mc:Choice xmlns:p14="http://schemas.microsoft.com/office/powerpoint/2010/main" Requires="p14">
+  <mc:AlternateContent xmlns:mc="http://schemas.openxmlformats.org/markup-compatibility/2006" xmlns:p14="http://schemas.microsoft.com/office/powerpoint/2010/main">
+    <mc:Choice Requires="p14">
       <p:transition spd="med" p14:dur="700" advClick="0" advTm="12000">
         <p:fade/>
       </p:transition>
     </mc:Choice>
-    <mc:Fallback>
+    <mc:Fallback xmlns="">
       <p:transition spd="med" advClick="0" advTm="12000">
         <p:fade/>
       </p:transition>
@@ -1989,13 +1989,13 @@
   <p:clrMapOvr>
     <a:masterClrMapping/>
   </p:clrMapOvr>
-  <mc:AlternateContent xmlns:mc="http://schemas.openxmlformats.org/markup-compatibility/2006">
-    <mc:Choice xmlns:p14="http://schemas.microsoft.com/office/powerpoint/2010/main" Requires="p14">
+  <mc:AlternateContent xmlns:mc="http://schemas.openxmlformats.org/markup-compatibility/2006" xmlns:p14="http://schemas.microsoft.com/office/powerpoint/2010/main">
+    <mc:Choice Requires="p14">
       <p:transition spd="med" p14:dur="700" advClick="0" advTm="12000">
         <p:fade/>
       </p:transition>
     </mc:Choice>
-    <mc:Fallback>
+    <mc:Fallback xmlns="">
       <p:transition spd="med" advClick="0" advTm="12000">
         <p:fade/>
       </p:transition>
@@ -2432,13 +2432,13 @@
   <p:clrMapOvr>
     <a:masterClrMapping/>
   </p:clrMapOvr>
-  <mc:AlternateContent xmlns:mc="http://schemas.openxmlformats.org/markup-compatibility/2006">
-    <mc:Choice xmlns:p14="http://schemas.microsoft.com/office/powerpoint/2010/main" Requires="p14">
+  <mc:AlternateContent xmlns:mc="http://schemas.openxmlformats.org/markup-compatibility/2006" xmlns:p14="http://schemas.microsoft.com/office/powerpoint/2010/main">
+    <mc:Choice Requires="p14">
       <p:transition spd="med" p14:dur="700" advClick="0" advTm="12000">
         <p:fade/>
       </p:transition>
     </mc:Choice>
-    <mc:Fallback>
+    <mc:Fallback xmlns="">
       <p:transition spd="med" advClick="0" advTm="12000">
         <p:fade/>
       </p:transition>
@@ -2562,13 +2562,13 @@
   <p:clrMapOvr>
     <a:masterClrMapping/>
   </p:clrMapOvr>
-  <mc:AlternateContent xmlns:mc="http://schemas.openxmlformats.org/markup-compatibility/2006">
-    <mc:Choice xmlns:p14="http://schemas.microsoft.com/office/powerpoint/2010/main" Requires="p14">
+  <mc:AlternateContent xmlns:mc="http://schemas.openxmlformats.org/markup-compatibility/2006" xmlns:p14="http://schemas.microsoft.com/office/powerpoint/2010/main">
+    <mc:Choice Requires="p14">
       <p:transition spd="med" p14:dur="700" advClick="0" advTm="12000">
         <p:fade/>
       </p:transition>
     </mc:Choice>
-    <mc:Fallback>
+    <mc:Fallback xmlns="">
       <p:transition spd="med" advClick="0" advTm="12000">
         <p:fade/>
       </p:transition>
@@ -2669,13 +2669,13 @@
   <p:clrMapOvr>
     <a:masterClrMapping/>
   </p:clrMapOvr>
-  <mc:AlternateContent xmlns:mc="http://schemas.openxmlformats.org/markup-compatibility/2006">
-    <mc:Choice xmlns:p14="http://schemas.microsoft.com/office/powerpoint/2010/main" Requires="p14">
+  <mc:AlternateContent xmlns:mc="http://schemas.openxmlformats.org/markup-compatibility/2006" xmlns:p14="http://schemas.microsoft.com/office/powerpoint/2010/main">
+    <mc:Choice Requires="p14">
       <p:transition spd="med" p14:dur="700" advClick="0" advTm="12000">
         <p:fade/>
       </p:transition>
     </mc:Choice>
-    <mc:Fallback>
+    <mc:Fallback xmlns="">
       <p:transition spd="med" advClick="0" advTm="12000">
         <p:fade/>
       </p:transition>
@@ -2990,13 +2990,13 @@
   <p:clrMapOvr>
     <a:masterClrMapping/>
   </p:clrMapOvr>
-  <mc:AlternateContent xmlns:mc="http://schemas.openxmlformats.org/markup-compatibility/2006">
-    <mc:Choice xmlns:p14="http://schemas.microsoft.com/office/powerpoint/2010/main" Requires="p14">
+  <mc:AlternateContent xmlns:mc="http://schemas.openxmlformats.org/markup-compatibility/2006" xmlns:p14="http://schemas.microsoft.com/office/powerpoint/2010/main">
+    <mc:Choice Requires="p14">
       <p:transition spd="med" p14:dur="700" advClick="0" advTm="12000">
         <p:fade/>
       </p:transition>
     </mc:Choice>
-    <mc:Fallback>
+    <mc:Fallback xmlns="">
       <p:transition spd="med" advClick="0" advTm="12000">
         <p:fade/>
       </p:transition>
@@ -3259,13 +3259,13 @@
   <p:clrMapOvr>
     <a:masterClrMapping/>
   </p:clrMapOvr>
-  <mc:AlternateContent xmlns:mc="http://schemas.openxmlformats.org/markup-compatibility/2006">
-    <mc:Choice xmlns:p14="http://schemas.microsoft.com/office/powerpoint/2010/main" Requires="p14">
+  <mc:AlternateContent xmlns:mc="http://schemas.openxmlformats.org/markup-compatibility/2006" xmlns:p14="http://schemas.microsoft.com/office/powerpoint/2010/main">
+    <mc:Choice Requires="p14">
       <p:transition spd="med" p14:dur="700" advClick="0" advTm="12000">
         <p:fade/>
       </p:transition>
     </mc:Choice>
-    <mc:Fallback>
+    <mc:Fallback xmlns="">
       <p:transition spd="med" advClick="0" advTm="12000">
         <p:fade/>
       </p:transition>
@@ -3563,13 +3563,13 @@
     <p:sldLayoutId id="2147483670" r:id="rId10"/>
     <p:sldLayoutId id="2147483671" r:id="rId11"/>
   </p:sldLayoutIdLst>
-  <mc:AlternateContent xmlns:mc="http://schemas.openxmlformats.org/markup-compatibility/2006">
-    <mc:Choice xmlns:p14="http://schemas.microsoft.com/office/powerpoint/2010/main" Requires="p14">
+  <mc:AlternateContent xmlns:mc="http://schemas.openxmlformats.org/markup-compatibility/2006" xmlns:p14="http://schemas.microsoft.com/office/powerpoint/2010/main">
+    <mc:Choice Requires="p14">
       <p:transition spd="med" p14:dur="700" advClick="0" advTm="12000">
         <p:fade/>
       </p:transition>
     </mc:Choice>
-    <mc:Fallback>
+    <mc:Fallback xmlns="">
       <p:transition spd="med" advClick="0" advTm="12000">
         <p:fade/>
       </p:transition>
@@ -4386,13 +4386,13 @@
   <p:clrMapOvr>
     <a:masterClrMapping/>
   </p:clrMapOvr>
-  <mc:AlternateContent xmlns:mc="http://schemas.openxmlformats.org/markup-compatibility/2006">
-    <mc:Choice xmlns:p14="http://schemas.microsoft.com/office/powerpoint/2010/main" Requires="p14">
+  <mc:AlternateContent xmlns:mc="http://schemas.openxmlformats.org/markup-compatibility/2006" xmlns:p14="http://schemas.microsoft.com/office/powerpoint/2010/main">
+    <mc:Choice Requires="p14">
       <p:transition spd="med" p14:dur="700" advClick="0" advTm="12000">
         <p:fade/>
       </p:transition>
     </mc:Choice>
-    <mc:Fallback>
+    <mc:Fallback xmlns="">
       <p:transition spd="med" advClick="0" advTm="12000">
         <p:fade/>
       </p:transition>
@@ -5068,13 +5068,13 @@
   <p:clrMapOvr>
     <a:masterClrMapping/>
   </p:clrMapOvr>
-  <mc:AlternateContent xmlns:mc="http://schemas.openxmlformats.org/markup-compatibility/2006">
-    <mc:Choice xmlns:p14="http://schemas.microsoft.com/office/powerpoint/2010/main" Requires="p14">
+  <mc:AlternateContent xmlns:mc="http://schemas.openxmlformats.org/markup-compatibility/2006" xmlns:p14="http://schemas.microsoft.com/office/powerpoint/2010/main">
+    <mc:Choice Requires="p14">
       <p:transition spd="med" p14:dur="700" advClick="0" advTm="8000">
         <p:fade/>
       </p:transition>
     </mc:Choice>
-    <mc:Fallback>
+    <mc:Fallback xmlns="">
       <p:transition spd="med" advClick="0" advTm="8000">
         <p:fade/>
       </p:transition>
@@ -5174,7 +5174,7 @@
         <p:spPr>
           <a:xfrm>
             <a:off x="5692567" y="458492"/>
-            <a:ext cx="6499433" cy="5775620"/>
+            <a:ext cx="6499433" cy="6185989"/>
           </a:xfrm>
           <a:prstGeom prst="rect">
             <a:avLst/>
@@ -5205,6 +5205,24 @@
                 <a:ea typeface="Meiryo UI" panose="020B0604030504040204" pitchFamily="50" charset="-128"/>
               </a:rPr>
               <a:t>株式会社のインターンシップに参加しませんか？</a:t>
+            </a:r>
+            <a:endParaRPr kumimoji="1" lang="en-US" altLang="ja-JP" sz="1600" b="1">
+              <a:latin typeface="Meiryo UI" panose="020B0604030504040204" pitchFamily="50" charset="-128"/>
+              <a:ea typeface="Meiryo UI" panose="020B0604030504040204" pitchFamily="50" charset="-128"/>
+            </a:endParaRPr>
+          </a:p>
+          <a:p>
+            <a:pPr>
+              <a:lnSpc>
+                <a:spcPts val="3200"/>
+              </a:lnSpc>
+            </a:pPr>
+            <a:r>
+              <a:rPr kumimoji="1" lang="ja-JP" altLang="en-US" sz="1600" b="1">
+                <a:latin typeface="Meiryo UI" panose="020B0604030504040204" pitchFamily="50" charset="-128"/>
+                <a:ea typeface="Meiryo UI" panose="020B0604030504040204" pitchFamily="50" charset="-128"/>
+              </a:rPr>
+              <a:t>オンライン開催なので会津から参加できます。</a:t>
             </a:r>
             <a:endParaRPr kumimoji="1" lang="en-US" altLang="ja-JP" sz="1600" b="1">
               <a:latin typeface="Meiryo UI" panose="020B0604030504040204" pitchFamily="50" charset="-128"/>
@@ -5554,13 +5572,13 @@
   <p:clrMapOvr>
     <a:masterClrMapping/>
   </p:clrMapOvr>
-  <mc:AlternateContent xmlns:mc="http://schemas.openxmlformats.org/markup-compatibility/2006">
-    <mc:Choice xmlns:p14="http://schemas.microsoft.com/office/powerpoint/2010/main" Requires="p14">
+  <mc:AlternateContent xmlns:mc="http://schemas.openxmlformats.org/markup-compatibility/2006" xmlns:p14="http://schemas.microsoft.com/office/powerpoint/2010/main">
+    <mc:Choice Requires="p14">
       <p:transition spd="med" p14:dur="700" advClick="0" advTm="8000">
         <p:fade/>
       </p:transition>
     </mc:Choice>
-    <mc:Fallback>
+    <mc:Fallback xmlns="">
       <p:transition spd="med" advClick="0" advTm="8000">
         <p:fade/>
       </p:transition>

</xml_diff>